<commit_message>
ajout slide presentation, amélioration réseau pour CIFAR100
</commit_message>
<xml_diff>
--- a/presentation/Distillation de conaissances.pptx
+++ b/presentation/Distillation de conaissances.pptx
@@ -11,7 +11,10 @@
     <p:sldId id="259" r:id="rId5"/>
     <p:sldId id="260" r:id="rId6"/>
     <p:sldId id="261" r:id="rId7"/>
-    <p:sldId id="262" r:id="rId8"/>
+    <p:sldId id="263" r:id="rId8"/>
+    <p:sldId id="264" r:id="rId9"/>
+    <p:sldId id="265" r:id="rId10"/>
+    <p:sldId id="262" r:id="rId11"/>
   </p:sldIdLst>
   <p:sldSz cx="12192000" cy="6858000"/>
   <p:notesSz cx="6858000" cy="9144000"/>
@@ -110,6 +113,11 @@
       </a:defRPr>
     </a:lvl9pPr>
   </p:defaultTextStyle>
+  <p:extLst>
+    <p:ext uri="{EFAFB233-063F-42B5-8137-9DF3F51BA10A}">
+      <p15:sldGuideLst xmlns:p15="http://schemas.microsoft.com/office/powerpoint/2012/main"/>
+    </p:ext>
+  </p:extLst>
 </p:presentation>
 </file>
 
@@ -244,7 +252,7 @@
           <a:p>
             <a:fld id="{B1A217C5-FA7C-7A44-9255-0FF98C27B035}" type="datetimeFigureOut">
               <a:rPr lang="en-US" smtClean="0"/>
-              <a:t>1/25/26</a:t>
+              <a:t>1/30/26</a:t>
             </a:fld>
             <a:endParaRPr lang="en-US"/>
           </a:p>
@@ -414,7 +422,7 @@
           <a:p>
             <a:fld id="{B1A217C5-FA7C-7A44-9255-0FF98C27B035}" type="datetimeFigureOut">
               <a:rPr lang="en-US" smtClean="0"/>
-              <a:t>1/25/26</a:t>
+              <a:t>1/30/26</a:t>
             </a:fld>
             <a:endParaRPr lang="en-US"/>
           </a:p>
@@ -594,7 +602,7 @@
           <a:p>
             <a:fld id="{B1A217C5-FA7C-7A44-9255-0FF98C27B035}" type="datetimeFigureOut">
               <a:rPr lang="en-US" smtClean="0"/>
-              <a:t>1/25/26</a:t>
+              <a:t>1/30/26</a:t>
             </a:fld>
             <a:endParaRPr lang="en-US"/>
           </a:p>
@@ -764,7 +772,7 @@
           <a:p>
             <a:fld id="{B1A217C5-FA7C-7A44-9255-0FF98C27B035}" type="datetimeFigureOut">
               <a:rPr lang="en-US" smtClean="0"/>
-              <a:t>1/25/26</a:t>
+              <a:t>1/30/26</a:t>
             </a:fld>
             <a:endParaRPr lang="en-US"/>
           </a:p>
@@ -1010,7 +1018,7 @@
           <a:p>
             <a:fld id="{B1A217C5-FA7C-7A44-9255-0FF98C27B035}" type="datetimeFigureOut">
               <a:rPr lang="en-US" smtClean="0"/>
-              <a:t>1/25/26</a:t>
+              <a:t>1/30/26</a:t>
             </a:fld>
             <a:endParaRPr lang="en-US"/>
           </a:p>
@@ -1242,7 +1250,7 @@
           <a:p>
             <a:fld id="{B1A217C5-FA7C-7A44-9255-0FF98C27B035}" type="datetimeFigureOut">
               <a:rPr lang="en-US" smtClean="0"/>
-              <a:t>1/25/26</a:t>
+              <a:t>1/30/26</a:t>
             </a:fld>
             <a:endParaRPr lang="en-US"/>
           </a:p>
@@ -1614,7 +1622,7 @@
           <a:p>
             <a:fld id="{B1A217C5-FA7C-7A44-9255-0FF98C27B035}" type="datetimeFigureOut">
               <a:rPr lang="en-US" smtClean="0"/>
-              <a:t>1/25/26</a:t>
+              <a:t>1/30/26</a:t>
             </a:fld>
             <a:endParaRPr lang="en-US"/>
           </a:p>
@@ -1732,7 +1740,7 @@
           <a:p>
             <a:fld id="{B1A217C5-FA7C-7A44-9255-0FF98C27B035}" type="datetimeFigureOut">
               <a:rPr lang="en-US" smtClean="0"/>
-              <a:t>1/25/26</a:t>
+              <a:t>1/30/26</a:t>
             </a:fld>
             <a:endParaRPr lang="en-US"/>
           </a:p>
@@ -1827,7 +1835,7 @@
           <a:p>
             <a:fld id="{B1A217C5-FA7C-7A44-9255-0FF98C27B035}" type="datetimeFigureOut">
               <a:rPr lang="en-US" smtClean="0"/>
-              <a:t>1/25/26</a:t>
+              <a:t>1/30/26</a:t>
             </a:fld>
             <a:endParaRPr lang="en-US"/>
           </a:p>
@@ -2104,7 +2112,7 @@
           <a:p>
             <a:fld id="{B1A217C5-FA7C-7A44-9255-0FF98C27B035}" type="datetimeFigureOut">
               <a:rPr lang="en-US" smtClean="0"/>
-              <a:t>1/25/26</a:t>
+              <a:t>1/30/26</a:t>
             </a:fld>
             <a:endParaRPr lang="en-US"/>
           </a:p>
@@ -2366,7 +2374,7 @@
           <a:p>
             <a:fld id="{B1A217C5-FA7C-7A44-9255-0FF98C27B035}" type="datetimeFigureOut">
               <a:rPr lang="en-US" smtClean="0"/>
-              <a:t>1/25/26</a:t>
+              <a:t>1/30/26</a:t>
             </a:fld>
             <a:endParaRPr lang="en-US"/>
           </a:p>
@@ -2579,7 +2587,7 @@
           <a:p>
             <a:fld id="{B1A217C5-FA7C-7A44-9255-0FF98C27B035}" type="datetimeFigureOut">
               <a:rPr lang="en-US" smtClean="0"/>
-              <a:t>1/25/26</a:t>
+              <a:t>1/30/26</a:t>
             </a:fld>
             <a:endParaRPr lang="en-US"/>
           </a:p>
@@ -3109,6 +3117,95 @@
 </p:sld>
 </file>
 
+<file path=ppt/slides/slide10.xml><?xml version="1.0" encoding="utf-8"?>
+<p:sld xmlns:a="http://schemas.openxmlformats.org/drawingml/2006/main" xmlns:r="http://schemas.openxmlformats.org/officeDocument/2006/relationships" xmlns:p="http://schemas.openxmlformats.org/presentationml/2006/main">
+  <p:cSld>
+    <p:spTree>
+      <p:nvGrpSpPr>
+        <p:cNvPr id="1" name=""/>
+        <p:cNvGrpSpPr/>
+        <p:nvPr/>
+      </p:nvGrpSpPr>
+      <p:grpSpPr>
+        <a:xfrm>
+          <a:off x="0" y="0"/>
+          <a:ext cx="0" cy="0"/>
+          <a:chOff x="0" y="0"/>
+          <a:chExt cx="0" cy="0"/>
+        </a:xfrm>
+      </p:grpSpPr>
+      <p:sp>
+        <p:nvSpPr>
+          <p:cNvPr id="2" name="Titre 1">
+            <a:extLst>
+              <a:ext uri="{FF2B5EF4-FFF2-40B4-BE49-F238E27FC236}">
+                <a16:creationId xmlns:a16="http://schemas.microsoft.com/office/drawing/2014/main" id="{7F45809D-8E43-E1FB-6FCF-8DE3B81A51F3}"/>
+              </a:ext>
+            </a:extLst>
+          </p:cNvPr>
+          <p:cNvSpPr>
+            <a:spLocks noGrp="1"/>
+          </p:cNvSpPr>
+          <p:nvPr>
+            <p:ph type="title"/>
+          </p:nvPr>
+        </p:nvSpPr>
+        <p:spPr/>
+        <p:txBody>
+          <a:bodyPr/>
+          <a:lstStyle/>
+          <a:p>
+            <a:r>
+              <a:rPr lang="fr-FR" dirty="0"/>
+              <a:t>Principe à retenir</a:t>
+            </a:r>
+          </a:p>
+        </p:txBody>
+      </p:sp>
+      <p:sp>
+        <p:nvSpPr>
+          <p:cNvPr id="3" name="Espace réservé du contenu 2">
+            <a:extLst>
+              <a:ext uri="{FF2B5EF4-FFF2-40B4-BE49-F238E27FC236}">
+                <a16:creationId xmlns:a16="http://schemas.microsoft.com/office/drawing/2014/main" id="{16456222-F4ED-6213-64D4-7D15332FA48B}"/>
+              </a:ext>
+            </a:extLst>
+          </p:cNvPr>
+          <p:cNvSpPr>
+            <a:spLocks noGrp="1"/>
+          </p:cNvSpPr>
+          <p:nvPr>
+            <p:ph idx="1"/>
+          </p:nvPr>
+        </p:nvSpPr>
+        <p:spPr/>
+        <p:txBody>
+          <a:bodyPr/>
+          <a:lstStyle/>
+          <a:p>
+            <a:pPr marL="0" indent="0">
+              <a:buNone/>
+            </a:pPr>
+            <a:r>
+              <a:rPr lang="fr-FR" dirty="0"/>
+              <a:t>La distillation consiste à faire apprendre à un modèle les paternes qu’un plus gros modèle entrainé à trouvé. </a:t>
+            </a:r>
+          </a:p>
+        </p:txBody>
+      </p:sp>
+    </p:spTree>
+    <p:extLst>
+      <p:ext uri="{BB962C8B-B14F-4D97-AF65-F5344CB8AC3E}">
+        <p14:creationId xmlns:p14="http://schemas.microsoft.com/office/powerpoint/2010/main" val="442143583"/>
+      </p:ext>
+    </p:extLst>
+  </p:cSld>
+  <p:clrMapOvr>
+    <a:masterClrMapping/>
+  </p:clrMapOvr>
+</p:sld>
+</file>
+
 <file path=ppt/slides/slide2.xml><?xml version="1.0" encoding="utf-8"?>
 <p:sld xmlns:a="http://schemas.openxmlformats.org/drawingml/2006/main" xmlns:r="http://schemas.openxmlformats.org/officeDocument/2006/relationships" xmlns:p="http://schemas.openxmlformats.org/presentationml/2006/main">
   <p:cSld>
@@ -3560,8 +3657,8 @@
           </a:p>
         </p:txBody>
       </p:sp>
-      <mc:AlternateContent xmlns:mc="http://schemas.openxmlformats.org/markup-compatibility/2006">
-        <mc:Choice xmlns:a14="http://schemas.microsoft.com/office/drawing/2010/main" Requires="a14">
+      <mc:AlternateContent xmlns:mc="http://schemas.openxmlformats.org/markup-compatibility/2006" xmlns:a14="http://schemas.microsoft.com/office/drawing/2010/main">
+        <mc:Choice Requires="a14">
           <p:sp>
             <p:nvSpPr>
               <p:cNvPr id="3" name="Espace réservé du contenu 2">
@@ -4832,7 +4929,7 @@
             </p:txBody>
           </p:sp>
         </mc:Choice>
-        <mc:Fallback>
+        <mc:Fallback xmlns="">
           <p:sp>
             <p:nvSpPr>
               <p:cNvPr id="3" name="Espace réservé du contenu 2">
@@ -4968,8 +5065,8 @@
           </a:xfrm>
         </p:spPr>
       </p:pic>
-      <mc:AlternateContent xmlns:mc="http://schemas.openxmlformats.org/markup-compatibility/2006">
-        <mc:Choice xmlns:a14="http://schemas.microsoft.com/office/drawing/2010/main" Requires="a14">
+      <mc:AlternateContent xmlns:mc="http://schemas.openxmlformats.org/markup-compatibility/2006" xmlns:a14="http://schemas.microsoft.com/office/drawing/2010/main">
+        <mc:Choice Requires="a14">
           <p:sp>
             <p:nvSpPr>
               <p:cNvPr id="6" name="ZoneTexte 5">
@@ -5043,7 +5140,7 @@
             </p:txBody>
           </p:sp>
         </mc:Choice>
-        <mc:Fallback>
+        <mc:Fallback xmlns="">
           <p:sp>
             <p:nvSpPr>
               <p:cNvPr id="6" name="ZoneTexte 5">
@@ -5118,12 +5215,42 @@
           <a:chExt cx="0" cy="0"/>
         </a:xfrm>
       </p:grpSpPr>
+      <p:pic>
+        <p:nvPicPr>
+          <p:cNvPr id="6" name="Image 5">
+            <a:extLst>
+              <a:ext uri="{FF2B5EF4-FFF2-40B4-BE49-F238E27FC236}">
+                <a16:creationId xmlns:a16="http://schemas.microsoft.com/office/drawing/2014/main" id="{2256EFD2-578D-07C4-CAEC-B25A7A4BB667}"/>
+              </a:ext>
+            </a:extLst>
+          </p:cNvPr>
+          <p:cNvPicPr>
+            <a:picLocks noChangeAspect="1"/>
+          </p:cNvPicPr>
+          <p:nvPr/>
+        </p:nvPicPr>
+        <p:blipFill>
+          <a:blip r:embed="rId2"/>
+          <a:stretch>
+            <a:fillRect/>
+          </a:stretch>
+        </p:blipFill>
+        <p:spPr>
+          <a:xfrm>
+            <a:off x="7055556" y="3260348"/>
+            <a:ext cx="4298244" cy="3323816"/>
+          </a:xfrm>
+          <a:prstGeom prst="rect">
+            <a:avLst/>
+          </a:prstGeom>
+        </p:spPr>
+      </p:pic>
       <p:sp>
         <p:nvSpPr>
           <p:cNvPr id="2" name="Titre 1">
             <a:extLst>
               <a:ext uri="{FF2B5EF4-FFF2-40B4-BE49-F238E27FC236}">
-                <a16:creationId xmlns:a16="http://schemas.microsoft.com/office/drawing/2014/main" id="{7F45809D-8E43-E1FB-6FCF-8DE3B81A51F3}"/>
+                <a16:creationId xmlns:a16="http://schemas.microsoft.com/office/drawing/2014/main" id="{B20DF09D-AE6E-5101-6D38-C10AD04927ED}"/>
               </a:ext>
             </a:extLst>
           </p:cNvPr>
@@ -5141,38 +5268,155 @@
           <a:p>
             <a:r>
               <a:rPr lang="fr-FR" dirty="0"/>
-              <a:t>Principe à retenir</a:t>
-            </a:r>
-          </a:p>
-        </p:txBody>
-      </p:sp>
-      <p:sp>
-        <p:nvSpPr>
-          <p:cNvPr id="3" name="Espace réservé du contenu 2">
+              <a:t>Exemple : CIFAR10 et RESNET18</a:t>
+            </a:r>
+          </a:p>
+        </p:txBody>
+      </p:sp>
+      <p:pic>
+        <p:nvPicPr>
+          <p:cNvPr id="5" name="Espace réservé du contenu 4">
             <a:extLst>
               <a:ext uri="{FF2B5EF4-FFF2-40B4-BE49-F238E27FC236}">
-                <a16:creationId xmlns:a16="http://schemas.microsoft.com/office/drawing/2014/main" id="{16456222-F4ED-6213-64D4-7D15332FA48B}"/>
+                <a16:creationId xmlns:a16="http://schemas.microsoft.com/office/drawing/2014/main" id="{B299B99D-025E-3DAF-2961-2119CBDAEB4A}"/>
               </a:ext>
             </a:extLst>
           </p:cNvPr>
-          <p:cNvSpPr>
-            <a:spLocks noGrp="1"/>
-          </p:cNvSpPr>
+          <p:cNvPicPr>
+            <a:picLocks noGrp="1" noChangeAspect="1"/>
+          </p:cNvPicPr>
           <p:nvPr>
             <p:ph idx="1"/>
           </p:nvPr>
-        </p:nvSpPr>
-        <p:spPr/>
-        <p:txBody>
-          <a:bodyPr/>
-          <a:lstStyle/>
-          <a:p>
-            <a:pPr marL="0" indent="0">
-              <a:buNone/>
-            </a:pPr>
+        </p:nvPicPr>
+        <p:blipFill>
+          <a:blip r:embed="rId3"/>
+          <a:stretch>
+            <a:fillRect/>
+          </a:stretch>
+        </p:blipFill>
+        <p:spPr>
+          <a:xfrm>
+            <a:off x="838200" y="1690688"/>
+            <a:ext cx="5629016" cy="4351338"/>
+          </a:xfrm>
+        </p:spPr>
+      </p:pic>
+      <p:sp>
+        <p:nvSpPr>
+          <p:cNvPr id="7" name="ZoneTexte 6">
+            <a:extLst>
+              <a:ext uri="{FF2B5EF4-FFF2-40B4-BE49-F238E27FC236}">
+                <a16:creationId xmlns:a16="http://schemas.microsoft.com/office/drawing/2014/main" id="{0C872678-4A93-560E-9C02-11E2EE61C217}"/>
+              </a:ext>
+            </a:extLst>
+          </p:cNvPr>
+          <p:cNvSpPr txBox="1"/>
+          <p:nvPr/>
+        </p:nvSpPr>
+        <p:spPr>
+          <a:xfrm>
+            <a:off x="7705219" y="5857360"/>
+            <a:ext cx="3250096" cy="369332"/>
+          </a:xfrm>
+          <a:prstGeom prst="rect">
+            <a:avLst/>
+          </a:prstGeom>
+          <a:noFill/>
+        </p:spPr>
+        <p:txBody>
+          <a:bodyPr wrap="square" rtlCol="0">
+            <a:spAutoFit/>
+          </a:bodyPr>
+          <a:lstStyle/>
+          <a:p>
             <a:r>
               <a:rPr lang="fr-FR" dirty="0"/>
-              <a:t>La distillation consiste à faire apprendre à un modèle les paternes qu’un plus gros modèle entrainé à trouvé. </a:t>
+              <a:t>Réseau de convolution </a:t>
+            </a:r>
+            <a:r>
+              <a:rPr lang="fr-FR" dirty="0" err="1"/>
+              <a:t>Student</a:t>
+            </a:r>
+            <a:endParaRPr lang="fr-FR" dirty="0"/>
+          </a:p>
+        </p:txBody>
+      </p:sp>
+      <p:sp>
+        <p:nvSpPr>
+          <p:cNvPr id="3" name="ZoneTexte 2">
+            <a:extLst>
+              <a:ext uri="{FF2B5EF4-FFF2-40B4-BE49-F238E27FC236}">
+                <a16:creationId xmlns:a16="http://schemas.microsoft.com/office/drawing/2014/main" id="{74121103-AD59-83B0-5FA4-1516028ACD49}"/>
+              </a:ext>
+            </a:extLst>
+          </p:cNvPr>
+          <p:cNvSpPr txBox="1"/>
+          <p:nvPr/>
+        </p:nvSpPr>
+        <p:spPr>
+          <a:xfrm>
+            <a:off x="7055556" y="1506022"/>
+            <a:ext cx="4549422" cy="2031325"/>
+          </a:xfrm>
+          <a:prstGeom prst="rect">
+            <a:avLst/>
+          </a:prstGeom>
+          <a:noFill/>
+        </p:spPr>
+        <p:txBody>
+          <a:bodyPr wrap="square" rtlCol="0">
+            <a:spAutoFit/>
+          </a:bodyPr>
+          <a:lstStyle/>
+          <a:p>
+            <a:r>
+              <a:rPr lang="fr-FR" dirty="0"/>
+              <a:t>Teacher : ResNet18  </a:t>
+            </a:r>
+          </a:p>
+          <a:p>
+            <a:r>
+              <a:rPr lang="fr-FR" dirty="0"/>
+              <a:t>	- 11,173,962 paramètres</a:t>
+            </a:r>
+          </a:p>
+          <a:p>
+            <a:r>
+              <a:rPr lang="fr-FR" dirty="0"/>
+              <a:t>	- 95% </a:t>
+            </a:r>
+            <a:r>
+              <a:rPr lang="fr-FR" dirty="0" err="1"/>
+              <a:t>accuracy</a:t>
+            </a:r>
+            <a:r>
+              <a:rPr lang="fr-FR" dirty="0"/>
+              <a:t>, téléchargé depuis la 	librairie </a:t>
+            </a:r>
+            <a:r>
+              <a:rPr lang="fr-FR" dirty="0" err="1"/>
+              <a:t>timm</a:t>
+            </a:r>
+            <a:endParaRPr lang="fr-FR" dirty="0"/>
+          </a:p>
+          <a:p>
+            <a:endParaRPr lang="fr-FR" dirty="0"/>
+          </a:p>
+          <a:p>
+            <a:r>
+              <a:rPr lang="fr-FR" dirty="0" err="1"/>
+              <a:t>Student</a:t>
+            </a:r>
+            <a:r>
+              <a:rPr lang="fr-FR" dirty="0"/>
+              <a:t> : Un petit réseau de convolution</a:t>
+            </a:r>
+          </a:p>
+          <a:p>
+            <a:r>
+              <a:rPr lang="fr-FR" dirty="0"/>
+              <a:t>	-  98,970 paramètres</a:t>
             </a:r>
           </a:p>
         </p:txBody>
@@ -5180,7 +5424,246 @@
     </p:spTree>
     <p:extLst>
       <p:ext uri="{BB962C8B-B14F-4D97-AF65-F5344CB8AC3E}">
-        <p14:creationId xmlns:p14="http://schemas.microsoft.com/office/powerpoint/2010/main" val="442143583"/>
+        <p14:creationId xmlns:p14="http://schemas.microsoft.com/office/powerpoint/2010/main" val="3216631449"/>
+      </p:ext>
+    </p:extLst>
+  </p:cSld>
+  <p:clrMapOvr>
+    <a:masterClrMapping/>
+  </p:clrMapOvr>
+</p:sld>
+</file>
+
+<file path=ppt/slides/slide8.xml><?xml version="1.0" encoding="utf-8"?>
+<p:sld xmlns:a="http://schemas.openxmlformats.org/drawingml/2006/main" xmlns:r="http://schemas.openxmlformats.org/officeDocument/2006/relationships" xmlns:p="http://schemas.openxmlformats.org/presentationml/2006/main">
+  <p:cSld>
+    <p:spTree>
+      <p:nvGrpSpPr>
+        <p:cNvPr id="1" name=""/>
+        <p:cNvGrpSpPr/>
+        <p:nvPr/>
+      </p:nvGrpSpPr>
+      <p:grpSpPr>
+        <a:xfrm>
+          <a:off x="0" y="0"/>
+          <a:ext cx="0" cy="0"/>
+          <a:chOff x="0" y="0"/>
+          <a:chExt cx="0" cy="0"/>
+        </a:xfrm>
+      </p:grpSpPr>
+      <p:sp>
+        <p:nvSpPr>
+          <p:cNvPr id="2" name="Titre 1">
+            <a:extLst>
+              <a:ext uri="{FF2B5EF4-FFF2-40B4-BE49-F238E27FC236}">
+                <a16:creationId xmlns:a16="http://schemas.microsoft.com/office/drawing/2014/main" id="{09EF933F-D092-4C24-A38D-B9EB595F9043}"/>
+              </a:ext>
+            </a:extLst>
+          </p:cNvPr>
+          <p:cNvSpPr>
+            <a:spLocks noGrp="1"/>
+          </p:cNvSpPr>
+          <p:nvPr>
+            <p:ph type="title"/>
+          </p:nvPr>
+        </p:nvSpPr>
+        <p:spPr/>
+        <p:txBody>
+          <a:bodyPr/>
+          <a:lstStyle/>
+          <a:p>
+            <a:r>
+              <a:rPr lang="fr-FR" dirty="0"/>
+              <a:t>Exemple : Entrainement</a:t>
+            </a:r>
+          </a:p>
+        </p:txBody>
+      </p:sp>
+      <p:pic>
+        <p:nvPicPr>
+          <p:cNvPr id="5" name="Espace réservé du contenu 4">
+            <a:extLst>
+              <a:ext uri="{FF2B5EF4-FFF2-40B4-BE49-F238E27FC236}">
+                <a16:creationId xmlns:a16="http://schemas.microsoft.com/office/drawing/2014/main" id="{696B9140-2B64-0907-6755-47D8FAD7A09B}"/>
+              </a:ext>
+            </a:extLst>
+          </p:cNvPr>
+          <p:cNvPicPr>
+            <a:picLocks noGrp="1" noChangeAspect="1"/>
+          </p:cNvPicPr>
+          <p:nvPr>
+            <p:ph idx="1"/>
+          </p:nvPr>
+        </p:nvPicPr>
+        <p:blipFill>
+          <a:blip r:embed="rId2"/>
+          <a:stretch>
+            <a:fillRect/>
+          </a:stretch>
+        </p:blipFill>
+        <p:spPr>
+          <a:xfrm>
+            <a:off x="6096000" y="1690688"/>
+            <a:ext cx="5257800" cy="4152900"/>
+          </a:xfrm>
+        </p:spPr>
+      </p:pic>
+      <p:pic>
+        <p:nvPicPr>
+          <p:cNvPr id="7" name="Image 6">
+            <a:extLst>
+              <a:ext uri="{FF2B5EF4-FFF2-40B4-BE49-F238E27FC236}">
+                <a16:creationId xmlns:a16="http://schemas.microsoft.com/office/drawing/2014/main" id="{E67A65BF-F6A7-F78C-A1A4-FFCBDC212602}"/>
+              </a:ext>
+            </a:extLst>
+          </p:cNvPr>
+          <p:cNvPicPr>
+            <a:picLocks noChangeAspect="1"/>
+          </p:cNvPicPr>
+          <p:nvPr/>
+        </p:nvPicPr>
+        <p:blipFill>
+          <a:blip r:embed="rId3"/>
+          <a:stretch>
+            <a:fillRect/>
+          </a:stretch>
+        </p:blipFill>
+        <p:spPr>
+          <a:xfrm>
+            <a:off x="838200" y="1690688"/>
+            <a:ext cx="5308600" cy="4152900"/>
+          </a:xfrm>
+          <a:prstGeom prst="rect">
+            <a:avLst/>
+          </a:prstGeom>
+        </p:spPr>
+      </p:pic>
+    </p:spTree>
+    <p:extLst>
+      <p:ext uri="{BB962C8B-B14F-4D97-AF65-F5344CB8AC3E}">
+        <p14:creationId xmlns:p14="http://schemas.microsoft.com/office/powerpoint/2010/main" val="921161360"/>
+      </p:ext>
+    </p:extLst>
+  </p:cSld>
+  <p:clrMapOvr>
+    <a:masterClrMapping/>
+  </p:clrMapOvr>
+</p:sld>
+</file>
+
+<file path=ppt/slides/slide9.xml><?xml version="1.0" encoding="utf-8"?>
+<p:sld xmlns:a="http://schemas.openxmlformats.org/drawingml/2006/main" xmlns:r="http://schemas.openxmlformats.org/officeDocument/2006/relationships" xmlns:p="http://schemas.openxmlformats.org/presentationml/2006/main">
+  <p:cSld>
+    <p:spTree>
+      <p:nvGrpSpPr>
+        <p:cNvPr id="1" name=""/>
+        <p:cNvGrpSpPr/>
+        <p:nvPr/>
+      </p:nvGrpSpPr>
+      <p:grpSpPr>
+        <a:xfrm>
+          <a:off x="0" y="0"/>
+          <a:ext cx="0" cy="0"/>
+          <a:chOff x="0" y="0"/>
+          <a:chExt cx="0" cy="0"/>
+        </a:xfrm>
+      </p:grpSpPr>
+      <p:sp>
+        <p:nvSpPr>
+          <p:cNvPr id="2" name="Titre 1">
+            <a:extLst>
+              <a:ext uri="{FF2B5EF4-FFF2-40B4-BE49-F238E27FC236}">
+                <a16:creationId xmlns:a16="http://schemas.microsoft.com/office/drawing/2014/main" id="{1063F50D-B60D-AFD5-02AB-2AB35D174963}"/>
+              </a:ext>
+            </a:extLst>
+          </p:cNvPr>
+          <p:cNvSpPr>
+            <a:spLocks noGrp="1"/>
+          </p:cNvSpPr>
+          <p:nvPr>
+            <p:ph type="title"/>
+          </p:nvPr>
+        </p:nvSpPr>
+        <p:spPr/>
+        <p:txBody>
+          <a:bodyPr/>
+          <a:lstStyle/>
+          <a:p>
+            <a:r>
+              <a:rPr lang="fr-FR" dirty="0"/>
+              <a:t>Exemple : test</a:t>
+            </a:r>
+          </a:p>
+        </p:txBody>
+      </p:sp>
+      <p:pic>
+        <p:nvPicPr>
+          <p:cNvPr id="5" name="Espace réservé du contenu 4">
+            <a:extLst>
+              <a:ext uri="{FF2B5EF4-FFF2-40B4-BE49-F238E27FC236}">
+                <a16:creationId xmlns:a16="http://schemas.microsoft.com/office/drawing/2014/main" id="{09943348-ABD6-7B9F-A062-D34A0D4A0ABC}"/>
+              </a:ext>
+            </a:extLst>
+          </p:cNvPr>
+          <p:cNvPicPr>
+            <a:picLocks noGrp="1" noChangeAspect="1"/>
+          </p:cNvPicPr>
+          <p:nvPr>
+            <p:ph idx="1"/>
+          </p:nvPr>
+        </p:nvPicPr>
+        <p:blipFill>
+          <a:blip r:embed="rId2"/>
+          <a:stretch>
+            <a:fillRect/>
+          </a:stretch>
+        </p:blipFill>
+        <p:spPr>
+          <a:xfrm>
+            <a:off x="838200" y="1690688"/>
+            <a:ext cx="5334000" cy="4152900"/>
+          </a:xfrm>
+        </p:spPr>
+      </p:pic>
+      <p:sp>
+        <p:nvSpPr>
+          <p:cNvPr id="6" name="ZoneTexte 5">
+            <a:extLst>
+              <a:ext uri="{FF2B5EF4-FFF2-40B4-BE49-F238E27FC236}">
+                <a16:creationId xmlns:a16="http://schemas.microsoft.com/office/drawing/2014/main" id="{15252749-6FB8-07F7-9ACF-F3E54595F0D4}"/>
+              </a:ext>
+            </a:extLst>
+          </p:cNvPr>
+          <p:cNvSpPr txBox="1"/>
+          <p:nvPr/>
+        </p:nvSpPr>
+        <p:spPr>
+          <a:xfrm>
+            <a:off x="7367155" y="2026227"/>
+            <a:ext cx="2722418" cy="369332"/>
+          </a:xfrm>
+          <a:prstGeom prst="rect">
+            <a:avLst/>
+          </a:prstGeom>
+          <a:noFill/>
+        </p:spPr>
+        <p:txBody>
+          <a:bodyPr wrap="square" rtlCol="0">
+            <a:spAutoFit/>
+          </a:bodyPr>
+          <a:lstStyle/>
+          <a:p>
+            <a:r>
+              <a:rPr lang="fr-FR" dirty="0"/>
+              <a:t>Meilleur pour alpha = 0.1</a:t>
+            </a:r>
+          </a:p>
+        </p:txBody>
+      </p:sp>
+    </p:spTree>
+    <p:extLst>
+      <p:ext uri="{BB962C8B-B14F-4D97-AF65-F5344CB8AC3E}">
+        <p14:creationId xmlns:p14="http://schemas.microsoft.com/office/powerpoint/2010/main" val="2575072510"/>
       </p:ext>
     </p:extLst>
   </p:cSld>

</xml_diff>

<commit_message>
Ajout de slides à la présentation
</commit_message>
<xml_diff>
--- a/presentation/Distillation de conaissances.pptx
+++ b/presentation/Distillation de conaissances.pptx
@@ -14,7 +14,10 @@
     <p:sldId id="263" r:id="rId8"/>
     <p:sldId id="264" r:id="rId9"/>
     <p:sldId id="265" r:id="rId10"/>
-    <p:sldId id="262" r:id="rId11"/>
+    <p:sldId id="266" r:id="rId11"/>
+    <p:sldId id="267" r:id="rId12"/>
+    <p:sldId id="268" r:id="rId13"/>
+    <p:sldId id="262" r:id="rId14"/>
   </p:sldIdLst>
   <p:sldSz cx="12192000" cy="6858000"/>
   <p:notesSz cx="6858000" cy="9144000"/>
@@ -3118,6 +3121,426 @@
 </file>
 
 <file path=ppt/slides/slide10.xml><?xml version="1.0" encoding="utf-8"?>
+<p:sld xmlns:a="http://schemas.openxmlformats.org/drawingml/2006/main" xmlns:r="http://schemas.openxmlformats.org/officeDocument/2006/relationships" xmlns:p="http://schemas.openxmlformats.org/presentationml/2006/main">
+  <p:cSld>
+    <p:spTree>
+      <p:nvGrpSpPr>
+        <p:cNvPr id="1" name=""/>
+        <p:cNvGrpSpPr/>
+        <p:nvPr/>
+      </p:nvGrpSpPr>
+      <p:grpSpPr>
+        <a:xfrm>
+          <a:off x="0" y="0"/>
+          <a:ext cx="0" cy="0"/>
+          <a:chOff x="0" y="0"/>
+          <a:chExt cx="0" cy="0"/>
+        </a:xfrm>
+      </p:grpSpPr>
+      <p:sp>
+        <p:nvSpPr>
+          <p:cNvPr id="2" name="Titre 1">
+            <a:extLst>
+              <a:ext uri="{FF2B5EF4-FFF2-40B4-BE49-F238E27FC236}">
+                <a16:creationId xmlns:a16="http://schemas.microsoft.com/office/drawing/2014/main" id="{8993B33B-5F5E-E9E4-BB84-264BB096BFB2}"/>
+              </a:ext>
+            </a:extLst>
+          </p:cNvPr>
+          <p:cNvSpPr>
+            <a:spLocks noGrp="1"/>
+          </p:cNvSpPr>
+          <p:nvPr>
+            <p:ph type="title"/>
+          </p:nvPr>
+        </p:nvSpPr>
+        <p:spPr/>
+        <p:txBody>
+          <a:bodyPr/>
+          <a:lstStyle/>
+          <a:p>
+            <a:r>
+              <a:rPr lang="fr-FR" dirty="0"/>
+              <a:t>CIFAR100 et RESNET18</a:t>
+            </a:r>
+          </a:p>
+        </p:txBody>
+      </p:sp>
+      <p:pic>
+        <p:nvPicPr>
+          <p:cNvPr id="5" name="Image 4">
+            <a:extLst>
+              <a:ext uri="{FF2B5EF4-FFF2-40B4-BE49-F238E27FC236}">
+                <a16:creationId xmlns:a16="http://schemas.microsoft.com/office/drawing/2014/main" id="{A6CD0E9A-5137-D0C0-A67C-EF6BC282F7B1}"/>
+              </a:ext>
+            </a:extLst>
+          </p:cNvPr>
+          <p:cNvPicPr>
+            <a:picLocks noChangeAspect="1"/>
+          </p:cNvPicPr>
+          <p:nvPr/>
+        </p:nvPicPr>
+        <p:blipFill>
+          <a:blip r:embed="rId2"/>
+          <a:stretch>
+            <a:fillRect/>
+          </a:stretch>
+        </p:blipFill>
+        <p:spPr>
+          <a:xfrm>
+            <a:off x="838200" y="1690688"/>
+            <a:ext cx="4694272" cy="4802187"/>
+          </a:xfrm>
+          <a:prstGeom prst="rect">
+            <a:avLst/>
+          </a:prstGeom>
+        </p:spPr>
+      </p:pic>
+      <p:sp>
+        <p:nvSpPr>
+          <p:cNvPr id="9" name="ZoneTexte 8">
+            <a:extLst>
+              <a:ext uri="{FF2B5EF4-FFF2-40B4-BE49-F238E27FC236}">
+                <a16:creationId xmlns:a16="http://schemas.microsoft.com/office/drawing/2014/main" id="{0B5F31D6-442A-74C1-B90A-AD398858DE8F}"/>
+              </a:ext>
+            </a:extLst>
+          </p:cNvPr>
+          <p:cNvSpPr txBox="1"/>
+          <p:nvPr/>
+        </p:nvSpPr>
+        <p:spPr>
+          <a:xfrm>
+            <a:off x="6076511" y="1690688"/>
+            <a:ext cx="6097772" cy="1754326"/>
+          </a:xfrm>
+          <a:prstGeom prst="rect">
+            <a:avLst/>
+          </a:prstGeom>
+          <a:noFill/>
+        </p:spPr>
+        <p:txBody>
+          <a:bodyPr wrap="square">
+            <a:spAutoFit/>
+          </a:bodyPr>
+          <a:lstStyle/>
+          <a:p>
+            <a:r>
+              <a:rPr lang="fr-FR" dirty="0"/>
+              <a:t>Teacher : ResNet18  </a:t>
+            </a:r>
+          </a:p>
+          <a:p>
+            <a:r>
+              <a:rPr lang="fr-FR" dirty="0"/>
+              <a:t>	- 11,220,132 paramètres</a:t>
+            </a:r>
+          </a:p>
+          <a:p>
+            <a:r>
+              <a:rPr lang="fr-FR" dirty="0"/>
+              <a:t>	- 80% </a:t>
+            </a:r>
+            <a:r>
+              <a:rPr lang="fr-FR" dirty="0" err="1"/>
+              <a:t>accuracy</a:t>
+            </a:r>
+            <a:r>
+              <a:rPr lang="fr-FR" dirty="0"/>
+              <a:t>, téléchargé depuis la librairie </a:t>
+            </a:r>
+            <a:r>
+              <a:rPr lang="fr-FR" dirty="0" err="1"/>
+              <a:t>timm</a:t>
+            </a:r>
+            <a:endParaRPr lang="fr-FR" dirty="0"/>
+          </a:p>
+          <a:p>
+            <a:endParaRPr lang="fr-FR" dirty="0"/>
+          </a:p>
+          <a:p>
+            <a:r>
+              <a:rPr lang="fr-FR" dirty="0" err="1"/>
+              <a:t>Student</a:t>
+            </a:r>
+            <a:r>
+              <a:rPr lang="fr-FR" dirty="0"/>
+              <a:t> : Un « petit » réseau de convolution</a:t>
+            </a:r>
+          </a:p>
+          <a:p>
+            <a:r>
+              <a:rPr lang="fr-FR" dirty="0"/>
+              <a:t>	-  1,199,876 paramètres</a:t>
+            </a:r>
+          </a:p>
+        </p:txBody>
+      </p:sp>
+    </p:spTree>
+    <p:extLst>
+      <p:ext uri="{BB962C8B-B14F-4D97-AF65-F5344CB8AC3E}">
+        <p14:creationId xmlns:p14="http://schemas.microsoft.com/office/powerpoint/2010/main" val="384463605"/>
+      </p:ext>
+    </p:extLst>
+  </p:cSld>
+  <p:clrMapOvr>
+    <a:masterClrMapping/>
+  </p:clrMapOvr>
+</p:sld>
+</file>
+
+<file path=ppt/slides/slide11.xml><?xml version="1.0" encoding="utf-8"?>
+<p:sld xmlns:a="http://schemas.openxmlformats.org/drawingml/2006/main" xmlns:r="http://schemas.openxmlformats.org/officeDocument/2006/relationships" xmlns:p="http://schemas.openxmlformats.org/presentationml/2006/main">
+  <p:cSld>
+    <p:spTree>
+      <p:nvGrpSpPr>
+        <p:cNvPr id="1" name=""/>
+        <p:cNvGrpSpPr/>
+        <p:nvPr/>
+      </p:nvGrpSpPr>
+      <p:grpSpPr>
+        <a:xfrm>
+          <a:off x="0" y="0"/>
+          <a:ext cx="0" cy="0"/>
+          <a:chOff x="0" y="0"/>
+          <a:chExt cx="0" cy="0"/>
+        </a:xfrm>
+      </p:grpSpPr>
+      <p:sp>
+        <p:nvSpPr>
+          <p:cNvPr id="2" name="Titre 1">
+            <a:extLst>
+              <a:ext uri="{FF2B5EF4-FFF2-40B4-BE49-F238E27FC236}">
+                <a16:creationId xmlns:a16="http://schemas.microsoft.com/office/drawing/2014/main" id="{09EF933F-D092-4C24-A38D-B9EB595F9043}"/>
+              </a:ext>
+            </a:extLst>
+          </p:cNvPr>
+          <p:cNvSpPr>
+            <a:spLocks noGrp="1"/>
+          </p:cNvSpPr>
+          <p:nvPr>
+            <p:ph type="title"/>
+          </p:nvPr>
+        </p:nvSpPr>
+        <p:spPr/>
+        <p:txBody>
+          <a:bodyPr/>
+          <a:lstStyle/>
+          <a:p>
+            <a:r>
+              <a:rPr lang="fr-FR" dirty="0"/>
+              <a:t>CIFAR100 : Entrainement</a:t>
+            </a:r>
+          </a:p>
+        </p:txBody>
+      </p:sp>
+      <p:pic>
+        <p:nvPicPr>
+          <p:cNvPr id="4" name="Image 3">
+            <a:extLst>
+              <a:ext uri="{FF2B5EF4-FFF2-40B4-BE49-F238E27FC236}">
+                <a16:creationId xmlns:a16="http://schemas.microsoft.com/office/drawing/2014/main" id="{AE593BB8-1815-0F68-FF57-BCA4F3EAAFB7}"/>
+              </a:ext>
+            </a:extLst>
+          </p:cNvPr>
+          <p:cNvPicPr>
+            <a:picLocks noChangeAspect="1"/>
+          </p:cNvPicPr>
+          <p:nvPr/>
+        </p:nvPicPr>
+        <p:blipFill>
+          <a:blip r:embed="rId2"/>
+          <a:stretch>
+            <a:fillRect/>
+          </a:stretch>
+        </p:blipFill>
+        <p:spPr>
+          <a:xfrm>
+            <a:off x="838200" y="1690688"/>
+            <a:ext cx="5219700" cy="4152900"/>
+          </a:xfrm>
+          <a:prstGeom prst="rect">
+            <a:avLst/>
+          </a:prstGeom>
+        </p:spPr>
+      </p:pic>
+      <p:pic>
+        <p:nvPicPr>
+          <p:cNvPr id="10" name="Espace réservé du contenu 9">
+            <a:extLst>
+              <a:ext uri="{FF2B5EF4-FFF2-40B4-BE49-F238E27FC236}">
+                <a16:creationId xmlns:a16="http://schemas.microsoft.com/office/drawing/2014/main" id="{9FAAE9CC-FDF2-9CC7-2B65-66FDCC829DA8}"/>
+              </a:ext>
+            </a:extLst>
+          </p:cNvPr>
+          <p:cNvPicPr>
+            <a:picLocks noGrp="1" noChangeAspect="1"/>
+          </p:cNvPicPr>
+          <p:nvPr>
+            <p:ph idx="1"/>
+          </p:nvPr>
+        </p:nvPicPr>
+        <p:blipFill>
+          <a:blip r:embed="rId3"/>
+          <a:stretch>
+            <a:fillRect/>
+          </a:stretch>
+        </p:blipFill>
+        <p:spPr>
+          <a:xfrm>
+            <a:off x="6134102" y="1690688"/>
+            <a:ext cx="5334000" cy="4152900"/>
+          </a:xfrm>
+        </p:spPr>
+      </p:pic>
+    </p:spTree>
+    <p:extLst>
+      <p:ext uri="{BB962C8B-B14F-4D97-AF65-F5344CB8AC3E}">
+        <p14:creationId xmlns:p14="http://schemas.microsoft.com/office/powerpoint/2010/main" val="3664552083"/>
+      </p:ext>
+    </p:extLst>
+  </p:cSld>
+  <p:clrMapOvr>
+    <a:masterClrMapping/>
+  </p:clrMapOvr>
+</p:sld>
+</file>
+
+<file path=ppt/slides/slide12.xml><?xml version="1.0" encoding="utf-8"?>
+<p:sld xmlns:a="http://schemas.openxmlformats.org/drawingml/2006/main" xmlns:r="http://schemas.openxmlformats.org/officeDocument/2006/relationships" xmlns:p="http://schemas.openxmlformats.org/presentationml/2006/main">
+  <p:cSld>
+    <p:spTree>
+      <p:nvGrpSpPr>
+        <p:cNvPr id="1" name=""/>
+        <p:cNvGrpSpPr/>
+        <p:nvPr/>
+      </p:nvGrpSpPr>
+      <p:grpSpPr>
+        <a:xfrm>
+          <a:off x="0" y="0"/>
+          <a:ext cx="0" cy="0"/>
+          <a:chOff x="0" y="0"/>
+          <a:chExt cx="0" cy="0"/>
+        </a:xfrm>
+      </p:grpSpPr>
+      <p:sp>
+        <p:nvSpPr>
+          <p:cNvPr id="2" name="Titre 1">
+            <a:extLst>
+              <a:ext uri="{FF2B5EF4-FFF2-40B4-BE49-F238E27FC236}">
+                <a16:creationId xmlns:a16="http://schemas.microsoft.com/office/drawing/2014/main" id="{1063F50D-B60D-AFD5-02AB-2AB35D174963}"/>
+              </a:ext>
+            </a:extLst>
+          </p:cNvPr>
+          <p:cNvSpPr>
+            <a:spLocks noGrp="1"/>
+          </p:cNvSpPr>
+          <p:nvPr>
+            <p:ph type="title"/>
+          </p:nvPr>
+        </p:nvSpPr>
+        <p:spPr/>
+        <p:txBody>
+          <a:bodyPr/>
+          <a:lstStyle/>
+          <a:p>
+            <a:r>
+              <a:rPr lang="fr-FR" dirty="0"/>
+              <a:t>CIFAR100 : test</a:t>
+            </a:r>
+          </a:p>
+        </p:txBody>
+      </p:sp>
+      <p:sp>
+        <p:nvSpPr>
+          <p:cNvPr id="6" name="ZoneTexte 5">
+            <a:extLst>
+              <a:ext uri="{FF2B5EF4-FFF2-40B4-BE49-F238E27FC236}">
+                <a16:creationId xmlns:a16="http://schemas.microsoft.com/office/drawing/2014/main" id="{15252749-6FB8-07F7-9ACF-F3E54595F0D4}"/>
+              </a:ext>
+            </a:extLst>
+          </p:cNvPr>
+          <p:cNvSpPr txBox="1"/>
+          <p:nvPr/>
+        </p:nvSpPr>
+        <p:spPr>
+          <a:xfrm>
+            <a:off x="7367154" y="2026227"/>
+            <a:ext cx="3986645" cy="923330"/>
+          </a:xfrm>
+          <a:prstGeom prst="rect">
+            <a:avLst/>
+          </a:prstGeom>
+          <a:noFill/>
+        </p:spPr>
+        <p:txBody>
+          <a:bodyPr wrap="square" rtlCol="0">
+            <a:spAutoFit/>
+          </a:bodyPr>
+          <a:lstStyle/>
+          <a:p>
+            <a:pPr marL="285750" indent="-285750">
+              <a:buFont typeface="Arial" panose="020B0604020202020204" pitchFamily="34" charset="0"/>
+              <a:buChar char="•"/>
+            </a:pPr>
+            <a:r>
+              <a:rPr lang="fr-FR" dirty="0"/>
+              <a:t>Meilleur pour alpha = 0.1</a:t>
+            </a:r>
+          </a:p>
+          <a:p>
+            <a:pPr marL="285750" indent="-285750">
+              <a:buFont typeface="Arial" panose="020B0604020202020204" pitchFamily="34" charset="0"/>
+              <a:buChar char="•"/>
+            </a:pPr>
+            <a:r>
+              <a:rPr lang="fr-FR" dirty="0"/>
+              <a:t>Sur apprentissage pour alpha autour de 0.5 (bizarre)</a:t>
+            </a:r>
+          </a:p>
+        </p:txBody>
+      </p:sp>
+      <p:pic>
+        <p:nvPicPr>
+          <p:cNvPr id="8" name="Espace réservé du contenu 7">
+            <a:extLst>
+              <a:ext uri="{FF2B5EF4-FFF2-40B4-BE49-F238E27FC236}">
+                <a16:creationId xmlns:a16="http://schemas.microsoft.com/office/drawing/2014/main" id="{4153779A-886C-C572-AE76-712477CA861D}"/>
+              </a:ext>
+            </a:extLst>
+          </p:cNvPr>
+          <p:cNvPicPr>
+            <a:picLocks noGrp="1" noChangeAspect="1"/>
+          </p:cNvPicPr>
+          <p:nvPr>
+            <p:ph idx="1"/>
+          </p:nvPr>
+        </p:nvPicPr>
+        <p:blipFill>
+          <a:blip r:embed="rId2"/>
+          <a:stretch>
+            <a:fillRect/>
+          </a:stretch>
+        </p:blipFill>
+        <p:spPr>
+          <a:xfrm>
+            <a:off x="838200" y="1690688"/>
+            <a:ext cx="5257800" cy="4152900"/>
+          </a:xfrm>
+        </p:spPr>
+      </p:pic>
+    </p:spTree>
+    <p:extLst>
+      <p:ext uri="{BB962C8B-B14F-4D97-AF65-F5344CB8AC3E}">
+        <p14:creationId xmlns:p14="http://schemas.microsoft.com/office/powerpoint/2010/main" val="3110860778"/>
+      </p:ext>
+    </p:extLst>
+  </p:cSld>
+  <p:clrMapOvr>
+    <a:masterClrMapping/>
+  </p:clrMapOvr>
+</p:sld>
+</file>
+
+<file path=ppt/slides/slide13.xml><?xml version="1.0" encoding="utf-8"?>
 <p:sld xmlns:a="http://schemas.openxmlformats.org/drawingml/2006/main" xmlns:r="http://schemas.openxmlformats.org/officeDocument/2006/relationships" xmlns:p="http://schemas.openxmlformats.org/presentationml/2006/main">
   <p:cSld>
     <p:spTree>
@@ -5474,7 +5897,7 @@
           <a:p>
             <a:r>
               <a:rPr lang="fr-FR" dirty="0"/>
-              <a:t>Exemple : Entrainement</a:t>
+              <a:t>CIFAR10 : Entrainement</a:t>
             </a:r>
           </a:p>
         </p:txBody>
@@ -5591,7 +6014,7 @@
           <a:p>
             <a:r>
               <a:rPr lang="fr-FR" dirty="0"/>
-              <a:t>Exemple : test</a:t>
+              <a:t>CIFAR10 : test</a:t>
             </a:r>
           </a:p>
         </p:txBody>
@@ -5620,7 +6043,7 @@
         </p:blipFill>
         <p:spPr>
           <a:xfrm>
-            <a:off x="838200" y="1690688"/>
+            <a:off x="762000" y="1690688"/>
             <a:ext cx="5334000" cy="4152900"/>
           </a:xfrm>
         </p:spPr>
@@ -5639,8 +6062,8 @@
         </p:nvSpPr>
         <p:spPr>
           <a:xfrm>
-            <a:off x="7367155" y="2026227"/>
-            <a:ext cx="2722418" cy="369332"/>
+            <a:off x="7367154" y="2026227"/>
+            <a:ext cx="3986645" cy="923330"/>
           </a:xfrm>
           <a:prstGeom prst="rect">
             <a:avLst/>
@@ -5653,9 +6076,23 @@
           </a:bodyPr>
           <a:lstStyle/>
           <a:p>
+            <a:pPr marL="285750" indent="-285750">
+              <a:buFont typeface="Arial" panose="020B0604020202020204" pitchFamily="34" charset="0"/>
+              <a:buChar char="•"/>
+            </a:pPr>
             <a:r>
               <a:rPr lang="fr-FR" dirty="0"/>
               <a:t>Meilleur pour alpha = 0.1</a:t>
+            </a:r>
+          </a:p>
+          <a:p>
+            <a:pPr marL="285750" indent="-285750">
+              <a:buFont typeface="Arial" panose="020B0604020202020204" pitchFamily="34" charset="0"/>
+              <a:buChar char="•"/>
+            </a:pPr>
+            <a:r>
+              <a:rPr lang="fr-FR" dirty="0"/>
+              <a:t>Sur apprentissage pour alpha autour de 0.5 (bizarre)</a:t>
             </a:r>
           </a:p>
         </p:txBody>

</xml_diff>